<commit_message>
modified presentation, changed logo
</commit_message>
<xml_diff>
--- a/Presentation.pptx
+++ b/Presentation.pptx
@@ -8,9 +8,9 @@
     <p:sldId id="258" r:id="rId2"/>
     <p:sldId id="259" r:id="rId3"/>
     <p:sldId id="260" r:id="rId4"/>
-    <p:sldId id="261" r:id="rId5"/>
+    <p:sldId id="264" r:id="rId5"/>
     <p:sldId id="263" r:id="rId6"/>
-    <p:sldId id="262" r:id="rId7"/>
+    <p:sldId id="261" r:id="rId7"/>
   </p:sldIdLst>
   <p:sldSz cx="12192000" cy="6858000"/>
   <p:notesSz cx="6858000" cy="9144000"/>
@@ -4039,7 +4039,26 @@
             </a:br>
             <a:r>
               <a:rPr lang="en-GB" sz="3600" dirty="0"/>
-              <a:t>but most of the time I’m not able to contact them afterwards as I can’t remember their full names” </a:t>
+              <a:t>but most of the time I’m not able to contact them afterwards as I can’t remember their full names”</a:t>
+            </a:r>
+            <a:br>
+              <a:rPr lang="en-GB" sz="3600" dirty="0">
+                <a:solidFill>
+                  <a:srgbClr val="FF0000"/>
+                </a:solidFill>
+              </a:rPr>
+            </a:br>
+            <a:r>
+              <a:rPr lang="en-GB" sz="3600" dirty="0">
+                <a:solidFill>
+                  <a:srgbClr val="FF0000"/>
+                </a:solidFill>
+              </a:rPr>
+              <a:t>IF SB CAN MAKE IT BETTER PLEASE DO!!</a:t>
+            </a:r>
+            <a:r>
+              <a:rPr lang="en-GB" sz="3600" dirty="0"/>
+              <a:t> </a:t>
             </a:r>
           </a:p>
         </p:txBody>
@@ -4153,39 +4172,59 @@
       </p:sp>
       <p:pic>
         <p:nvPicPr>
-          <p:cNvPr id="5" name="Symbol zastępczy zawartości 4">
+          <p:cNvPr id="4" name="Obraz 3">
             <a:extLst>
               <a:ext uri="{FF2B5EF4-FFF2-40B4-BE49-F238E27FC236}">
-                <a16:creationId xmlns:a16="http://schemas.microsoft.com/office/drawing/2014/main" id="{7FEF9B9B-7A55-4F71-80B7-A6670D845F1E}"/>
+                <a16:creationId xmlns:a16="http://schemas.microsoft.com/office/drawing/2014/main" id="{BDCC4982-82F3-4D6B-A396-04AFE4AB2FB0}"/>
               </a:ext>
             </a:extLst>
           </p:cNvPr>
           <p:cNvPicPr>
-            <a:picLocks noGrp="1" noChangeAspect="1"/>
+            <a:picLocks noChangeAspect="1"/>
           </p:cNvPicPr>
-          <p:nvPr>
-            <p:ph idx="1"/>
-          </p:nvPr>
+          <p:nvPr/>
         </p:nvPicPr>
         <p:blipFill>
-          <a:blip r:embed="rId2">
-            <a:extLst>
-              <a:ext uri="{28A0092B-C50C-407E-A947-70E740481C1C}">
-                <a14:useLocalDpi xmlns:a14="http://schemas.microsoft.com/office/drawing/2010/main" val="0"/>
-              </a:ext>
-            </a:extLst>
-          </a:blip>
+          <a:blip r:embed="rId2"/>
           <a:stretch>
             <a:fillRect/>
           </a:stretch>
         </p:blipFill>
         <p:spPr>
           <a:xfrm>
-            <a:off x="4292825" y="2261611"/>
+            <a:off x="4292825" y="2171700"/>
             <a:ext cx="3606349" cy="3479365"/>
           </a:xfrm>
+          <a:prstGeom prst="rect">
+            <a:avLst/>
+          </a:prstGeom>
         </p:spPr>
       </p:pic>
+      <p:sp>
+        <p:nvSpPr>
+          <p:cNvPr id="7" name="Symbol zastępczy zawartości 6">
+            <a:extLst>
+              <a:ext uri="{FF2B5EF4-FFF2-40B4-BE49-F238E27FC236}">
+                <a16:creationId xmlns:a16="http://schemas.microsoft.com/office/drawing/2014/main" id="{39316860-48AD-450F-9C7E-7FC576431D16}"/>
+              </a:ext>
+            </a:extLst>
+          </p:cNvPr>
+          <p:cNvSpPr>
+            <a:spLocks noGrp="1"/>
+          </p:cNvSpPr>
+          <p:nvPr>
+            <p:ph idx="1"/>
+          </p:nvPr>
+        </p:nvSpPr>
+        <p:spPr/>
+        <p:txBody>
+          <a:bodyPr/>
+          <a:lstStyle/>
+          <a:p>
+            <a:endParaRPr lang="en-GB"/>
+          </a:p>
+        </p:txBody>
+      </p:sp>
     </p:spTree>
     <p:extLst>
       <p:ext uri="{BB962C8B-B14F-4D97-AF65-F5344CB8AC3E}">
@@ -4221,7 +4260,7 @@
           <p:cNvPr id="2" name="Tytuł 1">
             <a:extLst>
               <a:ext uri="{FF2B5EF4-FFF2-40B4-BE49-F238E27FC236}">
-                <a16:creationId xmlns:a16="http://schemas.microsoft.com/office/drawing/2014/main" id="{0249A600-12FB-43FD-986E-8B55F3E4671F}"/>
+                <a16:creationId xmlns:a16="http://schemas.microsoft.com/office/drawing/2014/main" id="{5D6762F5-1BE4-41FA-A2F4-C8832FF4CA50}"/>
               </a:ext>
             </a:extLst>
           </p:cNvPr>
@@ -4232,102 +4271,51 @@
             <p:ph type="title"/>
           </p:nvPr>
         </p:nvSpPr>
-        <p:spPr>
-          <a:xfrm>
-            <a:off x="5184742" y="3970108"/>
-            <a:ext cx="6658466" cy="1325563"/>
-          </a:xfrm>
-        </p:spPr>
-        <p:txBody>
-          <a:bodyPr>
-            <a:normAutofit/>
-          </a:bodyPr>
+        <p:spPr/>
+        <p:txBody>
+          <a:bodyPr/>
           <a:lstStyle/>
           <a:p>
             <a:r>
-              <a:rPr lang="en-GB" sz="3800" dirty="0"/>
-              <a:t>… and see you at </a:t>
-            </a:r>
-          </a:p>
-        </p:txBody>
-      </p:sp>
-      <p:sp>
-        <p:nvSpPr>
-          <p:cNvPr id="4" name="pole tekstowe 3">
+              <a:rPr lang="en-GB" dirty="0">
+                <a:solidFill>
+                  <a:srgbClr val="FF0000"/>
+                </a:solidFill>
+              </a:rPr>
+              <a:t>SCREENSHOTS/SCREENCAPTURE one slide per page?</a:t>
+            </a:r>
+          </a:p>
+        </p:txBody>
+      </p:sp>
+      <p:sp>
+        <p:nvSpPr>
+          <p:cNvPr id="3" name="Symbol zastępczy zawartości 2">
             <a:extLst>
               <a:ext uri="{FF2B5EF4-FFF2-40B4-BE49-F238E27FC236}">
-                <a16:creationId xmlns:a16="http://schemas.microsoft.com/office/drawing/2014/main" id="{5EFB1D71-8FAF-4EA9-A3B3-D3E6ACC34D3B}"/>
+                <a16:creationId xmlns:a16="http://schemas.microsoft.com/office/drawing/2014/main" id="{2CBC1A4A-152A-4F1D-9567-18A23890CB0B}"/>
               </a:ext>
             </a:extLst>
           </p:cNvPr>
-          <p:cNvSpPr txBox="1"/>
-          <p:nvPr/>
-        </p:nvSpPr>
-        <p:spPr>
-          <a:xfrm flipH="1">
-            <a:off x="-65988" y="1225484"/>
-            <a:ext cx="12191999" cy="923330"/>
-          </a:xfrm>
-          <a:prstGeom prst="rect">
-            <a:avLst/>
-          </a:prstGeom>
-          <a:noFill/>
-        </p:spPr>
-        <p:txBody>
-          <a:bodyPr wrap="square" rtlCol="0">
-            <a:spAutoFit/>
-          </a:bodyPr>
+          <p:cNvSpPr>
+            <a:spLocks noGrp="1"/>
+          </p:cNvSpPr>
+          <p:nvPr>
+            <p:ph idx="1"/>
+          </p:nvPr>
+        </p:nvSpPr>
+        <p:spPr/>
+        <p:txBody>
+          <a:bodyPr/>
           <a:lstStyle/>
           <a:p>
-            <a:pPr algn="ctr"/>
-            <a:r>
-              <a:rPr lang="en-GB" sz="5400" dirty="0">
-                <a:latin typeface="+mj-lt"/>
-              </a:rPr>
-              <a:t>Thank you for listening …</a:t>
-            </a:r>
-          </a:p>
-        </p:txBody>
-      </p:sp>
-      <p:pic>
-        <p:nvPicPr>
-          <p:cNvPr id="5" name="Symbol zastępczy zawartości 4">
-            <a:extLst>
-              <a:ext uri="{FF2B5EF4-FFF2-40B4-BE49-F238E27FC236}">
-                <a16:creationId xmlns:a16="http://schemas.microsoft.com/office/drawing/2014/main" id="{C4E112C8-CBC3-4E3C-B2B5-659FC2BBAFF9}"/>
-              </a:ext>
-            </a:extLst>
-          </p:cNvPr>
-          <p:cNvPicPr>
-            <a:picLocks noGrp="1" noChangeAspect="1"/>
-          </p:cNvPicPr>
-          <p:nvPr>
-            <p:ph idx="1"/>
-          </p:nvPr>
-        </p:nvPicPr>
-        <p:blipFill>
-          <a:blip r:embed="rId2">
-            <a:extLst>
-              <a:ext uri="{28A0092B-C50C-407E-A947-70E740481C1C}">
-                <a14:useLocalDpi xmlns:a14="http://schemas.microsoft.com/office/drawing/2010/main" val="0"/>
-              </a:ext>
-            </a:extLst>
-          </a:blip>
-          <a:stretch>
-            <a:fillRect/>
-          </a:stretch>
-        </p:blipFill>
-        <p:spPr>
-          <a:xfrm>
-            <a:off x="9022814" y="3242549"/>
-            <a:ext cx="2260374" cy="2180783"/>
-          </a:xfrm>
-        </p:spPr>
-      </p:pic>
+            <a:endParaRPr lang="en-GB"/>
+          </a:p>
+        </p:txBody>
+      </p:sp>
     </p:spTree>
     <p:extLst>
       <p:ext uri="{BB962C8B-B14F-4D97-AF65-F5344CB8AC3E}">
-        <p14:creationId xmlns:p14="http://schemas.microsoft.com/office/powerpoint/2010/main" val="2283664485"/>
+        <p14:creationId xmlns:p14="http://schemas.microsoft.com/office/powerpoint/2010/main" val="2407712689"/>
       </p:ext>
     </p:extLst>
   </p:cSld>
@@ -4404,10 +4392,110 @@
           <a:bodyPr/>
           <a:lstStyle/>
           <a:p>
-            <a:endParaRPr lang="en-GB"/>
-          </a:p>
-        </p:txBody>
-      </p:sp>
+            <a:r>
+              <a:rPr lang="en-GB" dirty="0"/>
+              <a:t>Your data is very important for us</a:t>
+            </a:r>
+            <a:r>
+              <a:rPr lang="pl-PL" dirty="0"/>
+              <a:t>, </a:t>
+            </a:r>
+            <a:r>
+              <a:rPr lang="en-GB" dirty="0"/>
+              <a:t>this is why </a:t>
+            </a:r>
+            <a:r>
+              <a:rPr lang="en-GB" dirty="0" err="1"/>
+              <a:t>ShakeMate</a:t>
+            </a:r>
+            <a:r>
+              <a:rPr lang="en-GB" dirty="0"/>
+              <a:t> is </a:t>
+            </a:r>
+            <a:r>
+              <a:rPr lang="pl-PL" dirty="0"/>
+              <a:t>a </a:t>
+            </a:r>
+            <a:r>
+              <a:rPr lang="en-GB" dirty="0"/>
+              <a:t>safe and secure platform. </a:t>
+            </a:r>
+          </a:p>
+          <a:p>
+            <a:endParaRPr lang="en-GB" dirty="0"/>
+          </a:p>
+          <a:p>
+            <a:r>
+              <a:rPr lang="en-GB" dirty="0">
+                <a:solidFill>
+                  <a:srgbClr val="FF0000"/>
+                </a:solidFill>
+              </a:rPr>
+              <a:t>NEEEEED IMPROVMENT</a:t>
+            </a:r>
+          </a:p>
+        </p:txBody>
+      </p:sp>
+      <p:pic>
+        <p:nvPicPr>
+          <p:cNvPr id="6" name="Obraz 5">
+            <a:extLst>
+              <a:ext uri="{FF2B5EF4-FFF2-40B4-BE49-F238E27FC236}">
+                <a16:creationId xmlns:a16="http://schemas.microsoft.com/office/drawing/2014/main" id="{245B038B-F53D-45C3-BEF4-0D05A193F143}"/>
+              </a:ext>
+            </a:extLst>
+          </p:cNvPr>
+          <p:cNvPicPr>
+            <a:picLocks noChangeAspect="1"/>
+          </p:cNvPicPr>
+          <p:nvPr/>
+        </p:nvPicPr>
+        <p:blipFill>
+          <a:blip r:embed="rId2"/>
+          <a:stretch>
+            <a:fillRect/>
+          </a:stretch>
+        </p:blipFill>
+        <p:spPr>
+          <a:xfrm>
+            <a:off x="8036433" y="3129372"/>
+            <a:ext cx="3881120" cy="3881120"/>
+          </a:xfrm>
+          <a:prstGeom prst="rect">
+            <a:avLst/>
+          </a:prstGeom>
+        </p:spPr>
+      </p:pic>
+      <p:pic>
+        <p:nvPicPr>
+          <p:cNvPr id="7" name="Obraz 6">
+            <a:extLst>
+              <a:ext uri="{FF2B5EF4-FFF2-40B4-BE49-F238E27FC236}">
+                <a16:creationId xmlns:a16="http://schemas.microsoft.com/office/drawing/2014/main" id="{BDE16EFB-3BE9-4A43-A0F7-C555B62C3FFE}"/>
+              </a:ext>
+            </a:extLst>
+          </p:cNvPr>
+          <p:cNvPicPr>
+            <a:picLocks noChangeAspect="1"/>
+          </p:cNvPicPr>
+          <p:nvPr/>
+        </p:nvPicPr>
+        <p:blipFill>
+          <a:blip r:embed="rId3"/>
+          <a:stretch>
+            <a:fillRect/>
+          </a:stretch>
+        </p:blipFill>
+        <p:spPr>
+          <a:xfrm>
+            <a:off x="1610585" y="4671593"/>
+            <a:ext cx="1752375" cy="1690672"/>
+          </a:xfrm>
+          <a:prstGeom prst="rect">
+            <a:avLst/>
+          </a:prstGeom>
+        </p:spPr>
+      </p:pic>
     </p:spTree>
     <p:extLst>
       <p:ext uri="{BB962C8B-B14F-4D97-AF65-F5344CB8AC3E}">
@@ -4443,7 +4531,7 @@
           <p:cNvPr id="2" name="Tytuł 1">
             <a:extLst>
               <a:ext uri="{FF2B5EF4-FFF2-40B4-BE49-F238E27FC236}">
-                <a16:creationId xmlns:a16="http://schemas.microsoft.com/office/drawing/2014/main" id="{249258B8-3514-4EFD-8FB5-283AC3287B4C}"/>
+                <a16:creationId xmlns:a16="http://schemas.microsoft.com/office/drawing/2014/main" id="{0249A600-12FB-43FD-986E-8B55F3E4671F}"/>
               </a:ext>
             </a:extLst>
           </p:cNvPr>
@@ -4454,24 +4542,72 @@
             <p:ph type="title"/>
           </p:nvPr>
         </p:nvSpPr>
-        <p:spPr/>
-        <p:txBody>
-          <a:bodyPr/>
+        <p:spPr>
+          <a:xfrm>
+            <a:off x="5184742" y="3970108"/>
+            <a:ext cx="6658466" cy="1325563"/>
+          </a:xfrm>
+        </p:spPr>
+        <p:txBody>
+          <a:bodyPr>
+            <a:normAutofit/>
+          </a:bodyPr>
           <a:lstStyle/>
           <a:p>
-            <a:endParaRPr lang="en-GB"/>
-          </a:p>
-        </p:txBody>
-      </p:sp>
-      <p:sp>
-        <p:nvSpPr>
-          <p:cNvPr id="3" name="Symbol zastępczy zawartości 2">
+            <a:r>
+              <a:rPr lang="en-GB" sz="3800" dirty="0"/>
+              <a:t>… and see you at </a:t>
+            </a:r>
+          </a:p>
+        </p:txBody>
+      </p:sp>
+      <p:sp>
+        <p:nvSpPr>
+          <p:cNvPr id="4" name="pole tekstowe 3">
             <a:extLst>
               <a:ext uri="{FF2B5EF4-FFF2-40B4-BE49-F238E27FC236}">
-                <a16:creationId xmlns:a16="http://schemas.microsoft.com/office/drawing/2014/main" id="{4E62D48B-229B-4AA6-BC69-A601B40B9E23}"/>
+                <a16:creationId xmlns:a16="http://schemas.microsoft.com/office/drawing/2014/main" id="{5EFB1D71-8FAF-4EA9-A3B3-D3E6ACC34D3B}"/>
               </a:ext>
             </a:extLst>
           </p:cNvPr>
+          <p:cNvSpPr txBox="1"/>
+          <p:nvPr/>
+        </p:nvSpPr>
+        <p:spPr>
+          <a:xfrm flipH="1">
+            <a:off x="-96468" y="1225484"/>
+            <a:ext cx="12191999" cy="923330"/>
+          </a:xfrm>
+          <a:prstGeom prst="rect">
+            <a:avLst/>
+          </a:prstGeom>
+          <a:noFill/>
+        </p:spPr>
+        <p:txBody>
+          <a:bodyPr wrap="square" rtlCol="0">
+            <a:spAutoFit/>
+          </a:bodyPr>
+          <a:lstStyle/>
+          <a:p>
+            <a:pPr algn="ctr"/>
+            <a:r>
+              <a:rPr lang="en-GB" sz="5400" dirty="0">
+                <a:latin typeface="+mj-lt"/>
+              </a:rPr>
+              <a:t>Thank you for listening …</a:t>
+            </a:r>
+          </a:p>
+        </p:txBody>
+      </p:sp>
+      <p:sp>
+        <p:nvSpPr>
+          <p:cNvPr id="6" name="Symbol zastępczy zawartości 5">
+            <a:extLst>
+              <a:ext uri="{FF2B5EF4-FFF2-40B4-BE49-F238E27FC236}">
+                <a16:creationId xmlns:a16="http://schemas.microsoft.com/office/drawing/2014/main" id="{A2D5CCAC-B7B6-4F63-96C7-0B3ADE994C7E}"/>
+              </a:ext>
+            </a:extLst>
+          </p:cNvPr>
           <p:cNvSpPr>
             <a:spLocks noGrp="1"/>
           </p:cNvSpPr>
@@ -4484,42 +4620,44 @@
           <a:bodyPr/>
           <a:lstStyle/>
           <a:p>
-            <a:r>
-              <a:rPr lang="en-GB" dirty="0"/>
-              <a:t>Security </a:t>
-            </a:r>
-          </a:p>
-          <a:p>
-            <a:r>
-              <a:rPr lang="en-GB" dirty="0"/>
-              <a:t>Icons</a:t>
-            </a:r>
-          </a:p>
-          <a:p>
-            <a:r>
-              <a:rPr lang="en-GB" dirty="0" err="1"/>
-              <a:t>Moc</a:t>
-            </a:r>
-            <a:r>
-              <a:rPr lang="en-GB" dirty="0"/>
-              <a:t> profiles</a:t>
-            </a:r>
-          </a:p>
-          <a:p>
-            <a:r>
-              <a:rPr lang="en-GB" dirty="0"/>
-              <a:t>Presentations, intro screenshots, screen capture?, conclusion </a:t>
-            </a:r>
-          </a:p>
-          <a:p>
-            <a:endParaRPr lang="en-GB" dirty="0"/>
-          </a:p>
-        </p:txBody>
-      </p:sp>
+            <a:endParaRPr lang="en-GB"/>
+          </a:p>
+        </p:txBody>
+      </p:sp>
+      <p:pic>
+        <p:nvPicPr>
+          <p:cNvPr id="7" name="Obraz 6">
+            <a:extLst>
+              <a:ext uri="{FF2B5EF4-FFF2-40B4-BE49-F238E27FC236}">
+                <a16:creationId xmlns:a16="http://schemas.microsoft.com/office/drawing/2014/main" id="{A3F63A70-5738-4759-BDC8-B0EFEC090FD4}"/>
+              </a:ext>
+            </a:extLst>
+          </p:cNvPr>
+          <p:cNvPicPr>
+            <a:picLocks noChangeAspect="1"/>
+          </p:cNvPicPr>
+          <p:nvPr/>
+        </p:nvPicPr>
+        <p:blipFill>
+          <a:blip r:embed="rId2"/>
+          <a:stretch>
+            <a:fillRect/>
+          </a:stretch>
+        </p:blipFill>
+        <p:spPr>
+          <a:xfrm>
+            <a:off x="8985815" y="3292047"/>
+            <a:ext cx="2076749" cy="2003624"/>
+          </a:xfrm>
+          <a:prstGeom prst="rect">
+            <a:avLst/>
+          </a:prstGeom>
+        </p:spPr>
+      </p:pic>
     </p:spTree>
     <p:extLst>
       <p:ext uri="{BB962C8B-B14F-4D97-AF65-F5344CB8AC3E}">
-        <p14:creationId xmlns:p14="http://schemas.microsoft.com/office/powerpoint/2010/main" val="391169574"/>
+        <p14:creationId xmlns:p14="http://schemas.microsoft.com/office/powerpoint/2010/main" val="2283664485"/>
       </p:ext>
     </p:extLst>
   </p:cSld>

</xml_diff>